<commit_message>
Update Week3 Threads, Executors, and Runnables.pptx
</commit_message>
<xml_diff>
--- a/Week3 Threads, Executors, and Runnables.pptx
+++ b/Week3 Threads, Executors, and Runnables.pptx
@@ -8,12 +8,11 @@
     <p:sldId id="256" r:id="rId2"/>
     <p:sldId id="259" r:id="rId3"/>
     <p:sldId id="257" r:id="rId4"/>
-    <p:sldId id="264" r:id="rId5"/>
-    <p:sldId id="258" r:id="rId6"/>
-    <p:sldId id="261" r:id="rId7"/>
-    <p:sldId id="266" r:id="rId8"/>
-    <p:sldId id="260" r:id="rId9"/>
-    <p:sldId id="265" r:id="rId10"/>
+    <p:sldId id="258" r:id="rId5"/>
+    <p:sldId id="261" r:id="rId6"/>
+    <p:sldId id="266" r:id="rId7"/>
+    <p:sldId id="260" r:id="rId8"/>
+    <p:sldId id="265" r:id="rId9"/>
   </p:sldIdLst>
   <p:sldSz cx="12192000" cy="6858000"/>
   <p:notesSz cx="6858000" cy="9144000"/>
@@ -124,6 +123,7 @@
 <p1510:revInfo xmlns:a="http://schemas.openxmlformats.org/drawingml/2006/main" xmlns:r="http://schemas.openxmlformats.org/officeDocument/2006/relationships" xmlns:p1510="http://schemas.microsoft.com/office/powerpoint/2015/10/main">
   <p1510:revLst>
     <p1510:client id="{6FE3F032-4095-4FAF-B956-EB408395812E}" v="42" dt="2019-05-14T05:04:54.990"/>
+    <p1510:client id="{61FA1C11-95EE-430B-8484-626F63CB424D}" v="1" dt="2019-05-15T04:48:28.123"/>
   </p1510:revLst>
 </p1510:revInfo>
 </file>
@@ -393,6 +393,37 @@
     </pc:docChg>
   </pc:docChgLst>
   <pc:docChgLst>
+    <pc:chgData name="Edgar Romero" userId="4277ae02-cb03-4964-a174-af1da477243e" providerId="ADAL" clId="{61FA1C11-95EE-430B-8484-626F63CB424D}"/>
+    <pc:docChg chg="delSld modSld">
+      <pc:chgData name="Edgar Romero" userId="4277ae02-cb03-4964-a174-af1da477243e" providerId="ADAL" clId="{61FA1C11-95EE-430B-8484-626F63CB424D}" dt="2019-05-15T04:50:23.687" v="5" actId="2696"/>
+      <pc:docMkLst>
+        <pc:docMk/>
+      </pc:docMkLst>
+      <pc:sldChg chg="modSp">
+        <pc:chgData name="Edgar Romero" userId="4277ae02-cb03-4964-a174-af1da477243e" providerId="ADAL" clId="{61FA1C11-95EE-430B-8484-626F63CB424D}" dt="2019-05-15T04:49:26.258" v="4" actId="1076"/>
+        <pc:sldMkLst>
+          <pc:docMk/>
+          <pc:sldMk cId="2579642615" sldId="257"/>
+        </pc:sldMkLst>
+        <pc:spChg chg="mod">
+          <ac:chgData name="Edgar Romero" userId="4277ae02-cb03-4964-a174-af1da477243e" providerId="ADAL" clId="{61FA1C11-95EE-430B-8484-626F63CB424D}" dt="2019-05-15T04:49:26.258" v="4" actId="1076"/>
+          <ac:spMkLst>
+            <pc:docMk/>
+            <pc:sldMk cId="2579642615" sldId="257"/>
+            <ac:spMk id="3" creationId="{1DE16EAF-DBD4-444D-A219-98DD60D4395A}"/>
+          </ac:spMkLst>
+        </pc:spChg>
+      </pc:sldChg>
+      <pc:sldChg chg="del">
+        <pc:chgData name="Edgar Romero" userId="4277ae02-cb03-4964-a174-af1da477243e" providerId="ADAL" clId="{61FA1C11-95EE-430B-8484-626F63CB424D}" dt="2019-05-15T04:50:23.687" v="5" actId="2696"/>
+        <pc:sldMkLst>
+          <pc:docMk/>
+          <pc:sldMk cId="1282804578" sldId="264"/>
+        </pc:sldMkLst>
+      </pc:sldChg>
+    </pc:docChg>
+  </pc:docChgLst>
+  <pc:docChgLst>
     <pc:chgData name="Edgar Romero" userId="4277ae02-cb03-4964-a174-af1da477243e" providerId="ADAL" clId="{15859D30-0044-4685-B56B-BB43AA41E0F1}"/>
     <pc:docChg chg="undo custSel addSld modSld sldOrd">
       <pc:chgData name="Edgar Romero" userId="4277ae02-cb03-4964-a174-af1da477243e" providerId="ADAL" clId="{15859D30-0044-4685-B56B-BB43AA41E0F1}" dt="2019-05-07T05:28:26.340" v="1201" actId="6549"/>
@@ -776,7 +807,7 @@
           <a:p>
             <a:fld id="{48A87A34-81AB-432B-8DAE-1953F412C126}" type="datetimeFigureOut">
               <a:rPr lang="en-US" dirty="0"/>
-              <a:t>5/13/2019</a:t>
+              <a:t>5/14/2019</a:t>
             </a:fld>
             <a:endParaRPr lang="en-US" dirty="0"/>
           </a:p>
@@ -1038,7 +1069,7 @@
           <a:p>
             <a:fld id="{48A87A34-81AB-432B-8DAE-1953F412C126}" type="datetimeFigureOut">
               <a:rPr lang="en-US" dirty="0"/>
-              <a:t>5/13/2019</a:t>
+              <a:t>5/14/2019</a:t>
             </a:fld>
             <a:endParaRPr lang="en-US" dirty="0"/>
           </a:p>
@@ -1265,7 +1296,7 @@
             <a:fld id="{48A87A34-81AB-432B-8DAE-1953F412C126}" type="datetimeFigureOut">
               <a:rPr lang="en-US" dirty="0"/>
               <a:pPr/>
-              <a:t>5/13/2019</a:t>
+              <a:t>5/14/2019</a:t>
             </a:fld>
             <a:endParaRPr lang="en-US" dirty="0"/>
           </a:p>
@@ -1571,7 +1602,7 @@
             <a:fld id="{48A87A34-81AB-432B-8DAE-1953F412C126}" type="datetimeFigureOut">
               <a:rPr lang="en-US" dirty="0"/>
               <a:pPr/>
-              <a:t>5/13/2019</a:t>
+              <a:t>5/14/2019</a:t>
             </a:fld>
             <a:endParaRPr lang="en-US" dirty="0"/>
           </a:p>
@@ -2040,7 +2071,7 @@
             <a:fld id="{48A87A34-81AB-432B-8DAE-1953F412C126}" type="datetimeFigureOut">
               <a:rPr lang="en-US" dirty="0"/>
               <a:pPr/>
-              <a:t>5/13/2019</a:t>
+              <a:t>5/14/2019</a:t>
             </a:fld>
             <a:endParaRPr lang="en-US" dirty="0"/>
           </a:p>
@@ -2582,7 +2613,7 @@
           <a:p>
             <a:fld id="{48A87A34-81AB-432B-8DAE-1953F412C126}" type="datetimeFigureOut">
               <a:rPr lang="en-US" dirty="0"/>
-              <a:t>5/13/2019</a:t>
+              <a:t>5/14/2019</a:t>
             </a:fld>
             <a:endParaRPr lang="en-US" dirty="0"/>
           </a:p>
@@ -3351,7 +3382,7 @@
           <a:p>
             <a:fld id="{48A87A34-81AB-432B-8DAE-1953F412C126}" type="datetimeFigureOut">
               <a:rPr lang="en-US" dirty="0"/>
-              <a:t>5/13/2019</a:t>
+              <a:t>5/14/2019</a:t>
             </a:fld>
             <a:endParaRPr lang="en-US" dirty="0"/>
           </a:p>
@@ -3521,7 +3552,7 @@
           <a:p>
             <a:fld id="{48A87A34-81AB-432B-8DAE-1953F412C126}" type="datetimeFigureOut">
               <a:rPr lang="en-US" dirty="0"/>
-              <a:t>5/13/2019</a:t>
+              <a:t>5/14/2019</a:t>
             </a:fld>
             <a:endParaRPr lang="en-US" dirty="0"/>
           </a:p>
@@ -3740,7 +3771,7 @@
             <a:fld id="{48A87A34-81AB-432B-8DAE-1953F412C126}" type="datetimeFigureOut">
               <a:rPr lang="en-US" dirty="0"/>
               <a:pPr/>
-              <a:t>5/13/2019</a:t>
+              <a:t>5/14/2019</a:t>
             </a:fld>
             <a:endParaRPr lang="en-US" dirty="0"/>
           </a:p>
@@ -3915,7 +3946,7 @@
           <a:p>
             <a:fld id="{48A87A34-81AB-432B-8DAE-1953F412C126}" type="datetimeFigureOut">
               <a:rPr lang="en-US" dirty="0"/>
-              <a:t>5/13/2019</a:t>
+              <a:t>5/14/2019</a:t>
             </a:fld>
             <a:endParaRPr lang="en-US" dirty="0"/>
           </a:p>
@@ -4200,7 +4231,7 @@
             <a:fld id="{48A87A34-81AB-432B-8DAE-1953F412C126}" type="datetimeFigureOut">
               <a:rPr lang="en-US" dirty="0"/>
               <a:pPr/>
-              <a:t>5/13/2019</a:t>
+              <a:t>5/14/2019</a:t>
             </a:fld>
             <a:endParaRPr lang="en-US" dirty="0"/>
           </a:p>
@@ -4437,7 +4468,7 @@
           <a:p>
             <a:fld id="{48A87A34-81AB-432B-8DAE-1953F412C126}" type="datetimeFigureOut">
               <a:rPr lang="en-US" dirty="0"/>
-              <a:t>5/13/2019</a:t>
+              <a:t>5/14/2019</a:t>
             </a:fld>
             <a:endParaRPr lang="en-US" dirty="0"/>
           </a:p>
@@ -4811,7 +4842,7 @@
           <a:p>
             <a:fld id="{48A87A34-81AB-432B-8DAE-1953F412C126}" type="datetimeFigureOut">
               <a:rPr lang="en-US" dirty="0"/>
-              <a:t>5/13/2019</a:t>
+              <a:t>5/14/2019</a:t>
             </a:fld>
             <a:endParaRPr lang="en-US" dirty="0"/>
           </a:p>
@@ -4924,7 +4955,7 @@
           <a:p>
             <a:fld id="{48A87A34-81AB-432B-8DAE-1953F412C126}" type="datetimeFigureOut">
               <a:rPr lang="en-US" dirty="0"/>
-              <a:t>5/13/2019</a:t>
+              <a:t>5/14/2019</a:t>
             </a:fld>
             <a:endParaRPr lang="en-US" dirty="0"/>
           </a:p>
@@ -5014,7 +5045,7 @@
           <a:p>
             <a:fld id="{48A87A34-81AB-432B-8DAE-1953F412C126}" type="datetimeFigureOut">
               <a:rPr lang="en-US" dirty="0"/>
-              <a:t>5/13/2019</a:t>
+              <a:t>5/14/2019</a:t>
             </a:fld>
             <a:endParaRPr lang="en-US" dirty="0"/>
           </a:p>
@@ -5258,7 +5289,7 @@
           <a:p>
             <a:fld id="{48A87A34-81AB-432B-8DAE-1953F412C126}" type="datetimeFigureOut">
               <a:rPr lang="en-US" dirty="0"/>
-              <a:t>5/13/2019</a:t>
+              <a:t>5/14/2019</a:t>
             </a:fld>
             <a:endParaRPr lang="en-US" dirty="0"/>
           </a:p>
@@ -5510,7 +5541,7 @@
           <a:p>
             <a:fld id="{48A87A34-81AB-432B-8DAE-1953F412C126}" type="datetimeFigureOut">
               <a:rPr lang="en-US" dirty="0"/>
-              <a:t>5/13/2019</a:t>
+              <a:t>5/14/2019</a:t>
             </a:fld>
             <a:endParaRPr lang="en-US" dirty="0"/>
           </a:p>
@@ -5749,7 +5780,7 @@
             <a:fld id="{48A87A34-81AB-432B-8DAE-1953F412C126}" type="datetimeFigureOut">
               <a:rPr lang="en-US" dirty="0"/>
               <a:pPr/>
-              <a:t>5/13/2019</a:t>
+              <a:t>5/14/2019</a:t>
             </a:fld>
             <a:endParaRPr lang="en-US" dirty="0"/>
           </a:p>
@@ -6520,83 +6551,94 @@
             <p:ph idx="1"/>
           </p:nvPr>
         </p:nvSpPr>
-        <p:spPr/>
+        <p:spPr>
+          <a:xfrm>
+            <a:off x="685800" y="2454442"/>
+            <a:ext cx="10820400" cy="4024125"/>
+          </a:xfrm>
+        </p:spPr>
         <p:txBody>
           <a:bodyPr>
             <a:normAutofit/>
           </a:bodyPr>
           <a:lstStyle/>
           <a:p>
-            <a:r>
-              <a:rPr lang="en-US" dirty="0"/>
-              <a:t>The </a:t>
-            </a:r>
-            <a:r>
-              <a:rPr lang="en-US" b="1" dirty="0"/>
-              <a:t>Collection in Java</a:t>
-            </a:r>
-            <a:r>
-              <a:rPr lang="en-US" dirty="0"/>
-              <a:t> is a framework that provides an architecture to store and manipulate the group of objects.</a:t>
-            </a:r>
-          </a:p>
-          <a:p>
-            <a:pPr marL="0" indent="0">
-              <a:buNone/>
-            </a:pPr>
-            <a:endParaRPr lang="en-US" dirty="0"/>
-          </a:p>
-          <a:p>
-            <a:r>
-              <a:rPr lang="en-US" dirty="0"/>
-              <a:t>Java Collections can achieve all the operations that you perform on a data such as searching, sorting, insertion, manipulation, and deletion.</a:t>
-            </a:r>
-          </a:p>
-          <a:p>
-            <a:pPr marL="0" indent="0">
-              <a:buNone/>
-            </a:pPr>
-            <a:endParaRPr lang="en-US" dirty="0"/>
-          </a:p>
-          <a:p>
-            <a:r>
-              <a:rPr lang="en-US" dirty="0"/>
-              <a:t>Java Collection means a single unit of objects. Java Collection framework provides many interfaces (Set, List, Queue, Deque) and classes (</a:t>
+            <a:pPr marL="0" indent="0">
+              <a:lnSpc>
+                <a:spcPct val="100000"/>
+              </a:lnSpc>
+              <a:buNone/>
+            </a:pPr>
+            <a:r>
+              <a:rPr lang="en-US" dirty="0"/>
+              <a:t>Java thread pool manages the collection of Runnable threads. The worker threads execute Runnable threads from the queue. </a:t>
+            </a:r>
+            <a:r>
+              <a:rPr lang="en-US" b="1" dirty="0" err="1"/>
+              <a:t>java.util.concurrent.Executors</a:t>
+            </a:r>
+            <a:r>
+              <a:rPr lang="en-US" dirty="0"/>
+              <a:t> provide factory and support methods for </a:t>
+            </a:r>
+            <a:r>
+              <a:rPr lang="en-US" b="1" dirty="0" err="1"/>
+              <a:t>java.util.concurrent.Executor</a:t>
+            </a:r>
+            <a:r>
+              <a:rPr lang="en-US" dirty="0"/>
+              <a:t> interface to create the thread pool in java.</a:t>
+            </a:r>
+          </a:p>
+          <a:p>
+            <a:pPr marL="0" indent="0">
+              <a:lnSpc>
+                <a:spcPct val="100000"/>
+              </a:lnSpc>
+              <a:buNone/>
+            </a:pPr>
+            <a:endParaRPr lang="en-US" dirty="0"/>
+          </a:p>
+          <a:p>
+            <a:pPr marL="0" indent="0">
+              <a:lnSpc>
+                <a:spcPct val="100000"/>
+              </a:lnSpc>
+              <a:buNone/>
+            </a:pPr>
+            <a:r>
+              <a:rPr lang="en-US" dirty="0"/>
+              <a:t>Executors is a utility class that also provides useful methods to work with </a:t>
             </a:r>
             <a:r>
               <a:rPr lang="en-US" dirty="0" err="1"/>
-              <a:t>ArrayList</a:t>
-            </a:r>
-            <a:r>
-              <a:rPr lang="en-US" dirty="0"/>
-              <a:t>, Vector, LinkedList, </a:t>
+              <a:t>ExecutorService</a:t>
+            </a:r>
+            <a:r>
+              <a:rPr lang="en-US" dirty="0"/>
+              <a:t>, </a:t>
             </a:r>
             <a:r>
               <a:rPr lang="en-US" dirty="0" err="1"/>
-              <a:t>PriorityQueue</a:t>
-            </a:r>
-            <a:r>
-              <a:rPr lang="en-US" dirty="0"/>
-              <a:t>, HashSet, </a:t>
+              <a:t>ScheduledExecutorService</a:t>
+            </a:r>
+            <a:r>
+              <a:rPr lang="en-US" dirty="0"/>
+              <a:t>, </a:t>
             </a:r>
             <a:r>
               <a:rPr lang="en-US" dirty="0" err="1"/>
-              <a:t>LinkedHashSet</a:t>
-            </a:r>
-            <a:r>
-              <a:rPr lang="en-US" dirty="0"/>
-              <a:t>, </a:t>
-            </a:r>
-            <a:r>
-              <a:rPr lang="en-US" dirty="0" err="1"/>
-              <a:t>TreeSet</a:t>
-            </a:r>
-            <a:r>
-              <a:rPr lang="en-US" dirty="0"/>
-              <a:t>).</a:t>
-            </a:r>
-          </a:p>
-          <a:p>
+              <a:t>ThreadFactory</a:t>
+            </a:r>
+            <a:r>
+              <a:rPr lang="en-US" dirty="0"/>
+              <a:t>, and Callable classes through various factory methods.</a:t>
+            </a:r>
+          </a:p>
+          <a:p>
+            <a:pPr marL="0" indent="0">
+              <a:buNone/>
+            </a:pPr>
             <a:endParaRPr lang="en-US" dirty="0"/>
           </a:p>
         </p:txBody>
@@ -6615,219 +6657,6 @@
 </file>
 
 <file path=ppt/slides/slide4.xml><?xml version="1.0" encoding="utf-8"?>
-<p:sld xmlns:a="http://schemas.openxmlformats.org/drawingml/2006/main" xmlns:r="http://schemas.openxmlformats.org/officeDocument/2006/relationships" xmlns:p="http://schemas.openxmlformats.org/presentationml/2006/main">
-  <p:cSld>
-    <p:spTree>
-      <p:nvGrpSpPr>
-        <p:cNvPr id="1" name=""/>
-        <p:cNvGrpSpPr/>
-        <p:nvPr/>
-      </p:nvGrpSpPr>
-      <p:grpSpPr>
-        <a:xfrm>
-          <a:off x="0" y="0"/>
-          <a:ext cx="0" cy="0"/>
-          <a:chOff x="0" y="0"/>
-          <a:chExt cx="0" cy="0"/>
-        </a:xfrm>
-      </p:grpSpPr>
-      <p:sp>
-        <p:nvSpPr>
-          <p:cNvPr id="2" name="Title 1">
-            <a:extLst>
-              <a:ext uri="{FF2B5EF4-FFF2-40B4-BE49-F238E27FC236}">
-                <a16:creationId xmlns:a16="http://schemas.microsoft.com/office/drawing/2014/main" id="{1A2EF139-2E18-4C4B-A6CF-064C221DF531}"/>
-              </a:ext>
-            </a:extLst>
-          </p:cNvPr>
-          <p:cNvSpPr>
-            <a:spLocks noGrp="1"/>
-          </p:cNvSpPr>
-          <p:nvPr>
-            <p:ph type="title"/>
-          </p:nvPr>
-        </p:nvSpPr>
-        <p:spPr>
-          <a:xfrm>
-            <a:off x="1785257" y="764373"/>
-            <a:ext cx="9720943" cy="1293028"/>
-          </a:xfrm>
-        </p:spPr>
-        <p:txBody>
-          <a:bodyPr>
-            <a:normAutofit fontScale="90000"/>
-          </a:bodyPr>
-          <a:lstStyle/>
-          <a:p>
-            <a:r>
-              <a:rPr lang="en-US" dirty="0"/>
-              <a:t>Summary of Collection Interfaces </a:t>
-            </a:r>
-            <a:br>
-              <a:rPr lang="en-US" dirty="0"/>
-            </a:br>
-            <a:r>
-              <a:rPr lang="en-US" dirty="0"/>
-              <a:t>in Java</a:t>
-            </a:r>
-            <a:br>
-              <a:rPr lang="en-US" dirty="0"/>
-            </a:br>
-            <a:endParaRPr lang="en-US" dirty="0"/>
-          </a:p>
-        </p:txBody>
-      </p:sp>
-      <p:sp>
-        <p:nvSpPr>
-          <p:cNvPr id="3" name="Content Placeholder 2">
-            <a:extLst>
-              <a:ext uri="{FF2B5EF4-FFF2-40B4-BE49-F238E27FC236}">
-                <a16:creationId xmlns:a16="http://schemas.microsoft.com/office/drawing/2014/main" id="{1DE16EAF-DBD4-444D-A219-98DD60D4395A}"/>
-              </a:ext>
-            </a:extLst>
-          </p:cNvPr>
-          <p:cNvSpPr>
-            <a:spLocks noGrp="1"/>
-          </p:cNvSpPr>
-          <p:nvPr>
-            <p:ph idx="1"/>
-          </p:nvPr>
-        </p:nvSpPr>
-        <p:spPr>
-          <a:xfrm>
-            <a:off x="413657" y="1719944"/>
-            <a:ext cx="11310257" cy="4898570"/>
-          </a:xfrm>
-        </p:spPr>
-        <p:txBody>
-          <a:bodyPr>
-            <a:normAutofit fontScale="92500" lnSpcReduction="10000"/>
-          </a:bodyPr>
-          <a:lstStyle/>
-          <a:p>
-            <a:r>
-              <a:rPr lang="en-US" sz="1600" dirty="0"/>
-              <a:t>The first tree starts with the Collection interface, which provides for the basic functionality used by all collections, such as add and remove methods. Its </a:t>
-            </a:r>
-            <a:r>
-              <a:rPr lang="en-US" sz="1600" dirty="0" err="1"/>
-              <a:t>subinterfaces</a:t>
-            </a:r>
-            <a:r>
-              <a:rPr lang="en-US" sz="1600" dirty="0"/>
-              <a:t> — Set, List, and Queue — provide for more specialized collections.</a:t>
-            </a:r>
-          </a:p>
-          <a:p>
-            <a:endParaRPr lang="en-US" sz="1000" dirty="0"/>
-          </a:p>
-          <a:p>
-            <a:r>
-              <a:rPr lang="en-US" sz="1600" dirty="0"/>
-              <a:t>The Set interface does not allow duplicate elements. This can be useful for storing collections such as a deck of cards or student records. The Set interface has a </a:t>
-            </a:r>
-            <a:r>
-              <a:rPr lang="en-US" sz="1600" dirty="0" err="1"/>
-              <a:t>subinterface</a:t>
-            </a:r>
-            <a:r>
-              <a:rPr lang="en-US" sz="1600" dirty="0"/>
-              <a:t>, </a:t>
-            </a:r>
-            <a:r>
-              <a:rPr lang="en-US" sz="1600" dirty="0" err="1"/>
-              <a:t>SortedSet</a:t>
-            </a:r>
-            <a:r>
-              <a:rPr lang="en-US" sz="1600" dirty="0"/>
-              <a:t>, that provides for ordering of elements in the set.</a:t>
-            </a:r>
-          </a:p>
-          <a:p>
-            <a:endParaRPr lang="en-US" sz="1000" dirty="0"/>
-          </a:p>
-          <a:p>
-            <a:r>
-              <a:rPr lang="en-US" sz="1600" dirty="0"/>
-              <a:t>The List interface provides for an ordered collection, for situations in which you need precise control over where each element is inserted. You can retrieve elements from a List by their exact position.</a:t>
-            </a:r>
-          </a:p>
-          <a:p>
-            <a:endParaRPr lang="en-US" sz="1000" dirty="0"/>
-          </a:p>
-          <a:p>
-            <a:r>
-              <a:rPr lang="en-US" sz="1600" dirty="0"/>
-              <a:t>The Queue interface enables additional insertion, extraction, and inspection operations. Elements in a Queue are typically ordered in on a FIFO basis.</a:t>
-            </a:r>
-          </a:p>
-          <a:p>
-            <a:endParaRPr lang="en-US" sz="1000" dirty="0"/>
-          </a:p>
-          <a:p>
-            <a:r>
-              <a:rPr lang="en-US" sz="1600" dirty="0"/>
-              <a:t>The Deque interface enables insertion, deletion, and inspection operations at both the ends. Elements in a Deque can be used in both LIFO and FIFO.</a:t>
-            </a:r>
-          </a:p>
-          <a:p>
-            <a:endParaRPr lang="en-US" sz="1000" dirty="0"/>
-          </a:p>
-          <a:p>
-            <a:r>
-              <a:rPr lang="en-US" sz="1600" dirty="0"/>
-              <a:t>The second tree starts with the Map interface, which maps keys and values similar to a </a:t>
-            </a:r>
-            <a:r>
-              <a:rPr lang="en-US" sz="1600" dirty="0" err="1"/>
-              <a:t>Hashtable</a:t>
-            </a:r>
-            <a:r>
-              <a:rPr lang="en-US" sz="1600" dirty="0"/>
-              <a:t>.</a:t>
-            </a:r>
-          </a:p>
-          <a:p>
-            <a:endParaRPr lang="en-US" sz="1000" dirty="0"/>
-          </a:p>
-          <a:p>
-            <a:r>
-              <a:rPr lang="en-US" sz="1600" dirty="0"/>
-              <a:t>Map's </a:t>
-            </a:r>
-            <a:r>
-              <a:rPr lang="en-US" sz="1600" dirty="0" err="1"/>
-              <a:t>subinterface</a:t>
-            </a:r>
-            <a:r>
-              <a:rPr lang="en-US" sz="1600" dirty="0"/>
-              <a:t>, </a:t>
-            </a:r>
-            <a:r>
-              <a:rPr lang="en-US" sz="1600" dirty="0" err="1"/>
-              <a:t>SortedMap</a:t>
-            </a:r>
-            <a:r>
-              <a:rPr lang="en-US" sz="1600" dirty="0"/>
-              <a:t>, maintains its key-value pairs in ascending order or in an order specified by a Comparator.</a:t>
-            </a:r>
-          </a:p>
-        </p:txBody>
-      </p:sp>
-    </p:spTree>
-    <p:extLst>
-      <p:ext uri="{BB962C8B-B14F-4D97-AF65-F5344CB8AC3E}">
-        <p14:creationId xmlns:p14="http://schemas.microsoft.com/office/powerpoint/2010/main" val="1282804578"/>
-      </p:ext>
-    </p:extLst>
-  </p:cSld>
-  <p:clrMapOvr>
-    <a:masterClrMapping/>
-  </p:clrMapOvr>
-</p:sld>
-</file>
-
-<file path=ppt/slides/slide5.xml><?xml version="1.0" encoding="utf-8"?>
 <p:sld xmlns:a="http://schemas.openxmlformats.org/drawingml/2006/main" xmlns:r="http://schemas.openxmlformats.org/officeDocument/2006/relationships" xmlns:p="http://schemas.openxmlformats.org/presentationml/2006/main">
   <p:cSld>
     <p:spTree>
@@ -7513,7 +7342,7 @@
 </p:sld>
 </file>
 
-<file path=ppt/slides/slide6.xml><?xml version="1.0" encoding="utf-8"?>
+<file path=ppt/slides/slide5.xml><?xml version="1.0" encoding="utf-8"?>
 <p:sld xmlns:a="http://schemas.openxmlformats.org/drawingml/2006/main" xmlns:r="http://schemas.openxmlformats.org/officeDocument/2006/relationships" xmlns:p="http://schemas.openxmlformats.org/presentationml/2006/main">
   <p:cSld>
     <p:spTree>
@@ -8054,7 +7883,7 @@
 </p:sld>
 </file>
 
-<file path=ppt/slides/slide7.xml><?xml version="1.0" encoding="utf-8"?>
+<file path=ppt/slides/slide6.xml><?xml version="1.0" encoding="utf-8"?>
 <p:sld xmlns:a="http://schemas.openxmlformats.org/drawingml/2006/main" xmlns:r="http://schemas.openxmlformats.org/officeDocument/2006/relationships" xmlns:p="http://schemas.openxmlformats.org/presentationml/2006/main">
   <p:cSld>
     <p:spTree>
@@ -8768,7 +8597,7 @@
 </p:sld>
 </file>
 
-<file path=ppt/slides/slide8.xml><?xml version="1.0" encoding="utf-8"?>
+<file path=ppt/slides/slide7.xml><?xml version="1.0" encoding="utf-8"?>
 <p:sld xmlns:a="http://schemas.openxmlformats.org/drawingml/2006/main" xmlns:r="http://schemas.openxmlformats.org/officeDocument/2006/relationships" xmlns:p="http://schemas.openxmlformats.org/presentationml/2006/main">
   <p:cSld>
     <p:spTree>
@@ -9384,7 +9213,7 @@
 </p:sld>
 </file>
 
-<file path=ppt/slides/slide9.xml><?xml version="1.0" encoding="utf-8"?>
+<file path=ppt/slides/slide8.xml><?xml version="1.0" encoding="utf-8"?>
 <p:sld xmlns:a="http://schemas.openxmlformats.org/drawingml/2006/main" xmlns:r="http://schemas.openxmlformats.org/officeDocument/2006/relationships" xmlns:p="http://schemas.openxmlformats.org/presentationml/2006/main">
   <p:cSld>
     <p:spTree>

</xml_diff>